<commit_message>
Dodan zakljucak u prez
</commit_message>
<xml_diff>
--- a/Diplmoski_Marko_Rasetina.pptx
+++ b/Diplmoski_Marko_Rasetina.pptx
@@ -17,7 +17,8 @@
     <p:sldId id="264" r:id="rId11"/>
     <p:sldId id="265" r:id="rId12"/>
     <p:sldId id="266" r:id="rId13"/>
-    <p:sldId id="267" r:id="rId14"/>
+    <p:sldId id="269" r:id="rId14"/>
+    <p:sldId id="267" r:id="rId15"/>
   </p:sldIdLst>
   <p:sldSz cx="12192000" cy="6858000"/>
   <p:notesSz cx="6858000" cy="9144000"/>
@@ -1653,6 +1654,13 @@
         </dgm:presLayoutVars>
       </dgm:prSet>
       <dgm:spPr/>
+      <dgm:t>
+        <a:bodyPr/>
+        <a:lstStyle/>
+        <a:p>
+          <a:endParaRPr lang="en-US"/>
+        </a:p>
+      </dgm:t>
     </dgm:pt>
   </dgm:ptLst>
   <dgm:cxnLst>
@@ -1917,10 +1925,24 @@
         </dgm:presLayoutVars>
       </dgm:prSet>
       <dgm:spPr/>
+      <dgm:t>
+        <a:bodyPr/>
+        <a:lstStyle/>
+        <a:p>
+          <a:endParaRPr lang="en-US"/>
+        </a:p>
+      </dgm:t>
     </dgm:pt>
     <dgm:pt modelId="{FF897C72-D7E5-4376-A343-1076EF827AA2}" type="pres">
       <dgm:prSet presAssocID="{BC1714A9-48ED-40FD-99F5-5EF40B677E6D}" presName="centerShape" presStyleLbl="node0" presStyleIdx="0" presStyleCnt="1" custScaleX="102707" custScaleY="83657"/>
       <dgm:spPr/>
+      <dgm:t>
+        <a:bodyPr/>
+        <a:lstStyle/>
+        <a:p>
+          <a:endParaRPr lang="en-US"/>
+        </a:p>
+      </dgm:t>
     </dgm:pt>
     <dgm:pt modelId="{AEA43BCD-C59E-4967-B6E2-C19D5C0BC460}" type="pres">
       <dgm:prSet presAssocID="{D4844E44-2522-4F2A-8045-A3B91F4F06B2}" presName="node" presStyleLbl="node1" presStyleIdx="0" presStyleCnt="4" custScaleX="154821">
@@ -1929,6 +1951,13 @@
         </dgm:presLayoutVars>
       </dgm:prSet>
       <dgm:spPr/>
+      <dgm:t>
+        <a:bodyPr/>
+        <a:lstStyle/>
+        <a:p>
+          <a:endParaRPr lang="en-US"/>
+        </a:p>
+      </dgm:t>
     </dgm:pt>
     <dgm:pt modelId="{4E9A1ADC-9BFE-44B0-B058-9783E69D17C8}" type="pres">
       <dgm:prSet presAssocID="{D4844E44-2522-4F2A-8045-A3B91F4F06B2}" presName="dummy" presStyleCnt="0"/>
@@ -1937,6 +1966,13 @@
     <dgm:pt modelId="{6F3416D3-B23A-4017-8058-79FE88ACDF68}" type="pres">
       <dgm:prSet presAssocID="{65337967-6803-4E58-B1F6-BA39519727AB}" presName="sibTrans" presStyleLbl="sibTrans2D1" presStyleIdx="0" presStyleCnt="4"/>
       <dgm:spPr/>
+      <dgm:t>
+        <a:bodyPr/>
+        <a:lstStyle/>
+        <a:p>
+          <a:endParaRPr lang="en-US"/>
+        </a:p>
+      </dgm:t>
     </dgm:pt>
     <dgm:pt modelId="{65FDC2E7-BCDE-428B-98EA-DD22C11C1B3F}" type="pres">
       <dgm:prSet presAssocID="{667EAEAE-F928-4E68-B0A1-1B0D92C09416}" presName="node" presStyleLbl="node1" presStyleIdx="1" presStyleCnt="4" custScaleX="154821" custRadScaleRad="129704" custRadScaleInc="0">
@@ -1945,6 +1981,13 @@
         </dgm:presLayoutVars>
       </dgm:prSet>
       <dgm:spPr/>
+      <dgm:t>
+        <a:bodyPr/>
+        <a:lstStyle/>
+        <a:p>
+          <a:endParaRPr lang="en-US"/>
+        </a:p>
+      </dgm:t>
     </dgm:pt>
     <dgm:pt modelId="{C897BFD5-D1A4-4D2E-B1ED-9C51283976AE}" type="pres">
       <dgm:prSet presAssocID="{667EAEAE-F928-4E68-B0A1-1B0D92C09416}" presName="dummy" presStyleCnt="0"/>
@@ -1953,6 +1996,13 @@
     <dgm:pt modelId="{813956AB-2F4D-4C19-B603-F9DD650796C6}" type="pres">
       <dgm:prSet presAssocID="{A1ABAB8F-2885-4115-9EF7-4279BF2BD4E1}" presName="sibTrans" presStyleLbl="sibTrans2D1" presStyleIdx="1" presStyleCnt="4"/>
       <dgm:spPr/>
+      <dgm:t>
+        <a:bodyPr/>
+        <a:lstStyle/>
+        <a:p>
+          <a:endParaRPr lang="en-US"/>
+        </a:p>
+      </dgm:t>
     </dgm:pt>
     <dgm:pt modelId="{2CDA359D-C421-40A8-8F81-A63225200C9F}" type="pres">
       <dgm:prSet presAssocID="{1F31C172-5CB1-4F5D-9169-B9CE904B4E8C}" presName="node" presStyleLbl="node1" presStyleIdx="2" presStyleCnt="4" custScaleX="154821">
@@ -1961,6 +2011,13 @@
         </dgm:presLayoutVars>
       </dgm:prSet>
       <dgm:spPr/>
+      <dgm:t>
+        <a:bodyPr/>
+        <a:lstStyle/>
+        <a:p>
+          <a:endParaRPr lang="en-US"/>
+        </a:p>
+      </dgm:t>
     </dgm:pt>
     <dgm:pt modelId="{D481E3F7-7D94-4BAC-9CF0-764AF51E5CCC}" type="pres">
       <dgm:prSet presAssocID="{1F31C172-5CB1-4F5D-9169-B9CE904B4E8C}" presName="dummy" presStyleCnt="0"/>
@@ -1969,6 +2026,13 @@
     <dgm:pt modelId="{3973AC8F-BBC3-435A-94ED-2ED8934F56BA}" type="pres">
       <dgm:prSet presAssocID="{924483EF-9A81-4B9E-A17F-C15A0B29E62D}" presName="sibTrans" presStyleLbl="sibTrans2D1" presStyleIdx="2" presStyleCnt="4"/>
       <dgm:spPr/>
+      <dgm:t>
+        <a:bodyPr/>
+        <a:lstStyle/>
+        <a:p>
+          <a:endParaRPr lang="en-US"/>
+        </a:p>
+      </dgm:t>
     </dgm:pt>
     <dgm:pt modelId="{89791189-1ECA-4C4D-9A30-5961BC7076DD}" type="pres">
       <dgm:prSet presAssocID="{A798F7FF-F0B8-4FCB-825E-E307F53F76B8}" presName="node" presStyleLbl="node1" presStyleIdx="3" presStyleCnt="4" custScaleX="154821" custRadScaleRad="127120">
@@ -1977,6 +2041,13 @@
         </dgm:presLayoutVars>
       </dgm:prSet>
       <dgm:spPr/>
+      <dgm:t>
+        <a:bodyPr/>
+        <a:lstStyle/>
+        <a:p>
+          <a:endParaRPr lang="en-US"/>
+        </a:p>
+      </dgm:t>
     </dgm:pt>
     <dgm:pt modelId="{3C81515F-75EA-499F-9D4D-653446116446}" type="pres">
       <dgm:prSet presAssocID="{A798F7FF-F0B8-4FCB-825E-E307F53F76B8}" presName="dummy" presStyleCnt="0"/>
@@ -1985,14 +2056,21 @@
     <dgm:pt modelId="{B6FA6E23-5D54-49C5-993A-D958F3591F9C}" type="pres">
       <dgm:prSet presAssocID="{C7DDBB70-4DF6-487E-B792-C7FECA235C8D}" presName="sibTrans" presStyleLbl="sibTrans2D1" presStyleIdx="3" presStyleCnt="4"/>
       <dgm:spPr/>
+      <dgm:t>
+        <a:bodyPr/>
+        <a:lstStyle/>
+        <a:p>
+          <a:endParaRPr lang="en-US"/>
+        </a:p>
+      </dgm:t>
     </dgm:pt>
   </dgm:ptLst>
   <dgm:cxnLst>
     <dgm:cxn modelId="{D194079F-ABA9-4A15-9D2E-E25434CC9DE8}" srcId="{BC1714A9-48ED-40FD-99F5-5EF40B677E6D}" destId="{D4844E44-2522-4F2A-8045-A3B91F4F06B2}" srcOrd="0" destOrd="0" parTransId="{A606606F-286D-4953-BAAF-0FF96911497C}" sibTransId="{65337967-6803-4E58-B1F6-BA39519727AB}"/>
     <dgm:cxn modelId="{A87CD72A-6EE3-4524-91AF-65ECB95181A9}" type="presOf" srcId="{A798F7FF-F0B8-4FCB-825E-E307F53F76B8}" destId="{89791189-1ECA-4C4D-9A30-5961BC7076DD}" srcOrd="0" destOrd="0" presId="urn:microsoft.com/office/officeart/2005/8/layout/radial6"/>
     <dgm:cxn modelId="{FED0FC7D-EA86-4ABD-9F3C-5787BA432C37}" srcId="{BC1714A9-48ED-40FD-99F5-5EF40B677E6D}" destId="{1F31C172-5CB1-4F5D-9169-B9CE904B4E8C}" srcOrd="2" destOrd="0" parTransId="{C48F20BA-8F9D-4D48-BC93-ED1F8BCE4F15}" sibTransId="{924483EF-9A81-4B9E-A17F-C15A0B29E62D}"/>
+    <dgm:cxn modelId="{4E03F905-58AD-45AF-AF26-E6AF92FE7B9C}" type="presOf" srcId="{C7DDBB70-4DF6-487E-B792-C7FECA235C8D}" destId="{B6FA6E23-5D54-49C5-993A-D958F3591F9C}" srcOrd="0" destOrd="0" presId="urn:microsoft.com/office/officeart/2005/8/layout/radial6"/>
     <dgm:cxn modelId="{00F88F51-98E1-43CF-A9D3-EE1980541FDD}" type="presOf" srcId="{924483EF-9A81-4B9E-A17F-C15A0B29E62D}" destId="{3973AC8F-BBC3-435A-94ED-2ED8934F56BA}" srcOrd="0" destOrd="0" presId="urn:microsoft.com/office/officeart/2005/8/layout/radial6"/>
-    <dgm:cxn modelId="{4E03F905-58AD-45AF-AF26-E6AF92FE7B9C}" type="presOf" srcId="{C7DDBB70-4DF6-487E-B792-C7FECA235C8D}" destId="{B6FA6E23-5D54-49C5-993A-D958F3591F9C}" srcOrd="0" destOrd="0" presId="urn:microsoft.com/office/officeart/2005/8/layout/radial6"/>
     <dgm:cxn modelId="{A537432D-6BB9-49D7-ABB9-A3E543DBD22B}" srcId="{BC1714A9-48ED-40FD-99F5-5EF40B677E6D}" destId="{667EAEAE-F928-4E68-B0A1-1B0D92C09416}" srcOrd="1" destOrd="0" parTransId="{4EF1BA6C-98B3-43E2-820B-3309BB9F7597}" sibTransId="{A1ABAB8F-2885-4115-9EF7-4279BF2BD4E1}"/>
     <dgm:cxn modelId="{9566B83C-8843-487D-A9CE-7941FE2EA1DE}" type="presOf" srcId="{1F31C172-5CB1-4F5D-9169-B9CE904B4E8C}" destId="{2CDA359D-C421-40A8-8F81-A63225200C9F}" srcOrd="0" destOrd="0" presId="urn:microsoft.com/office/officeart/2005/8/layout/radial6"/>
     <dgm:cxn modelId="{D0E3CD4E-C3D2-4E17-847D-465A7A31420C}" type="presOf" srcId="{A1ABAB8F-2885-4115-9EF7-4279BF2BD4E1}" destId="{813956AB-2F4D-4C19-B603-F9DD650796C6}" srcOrd="0" destOrd="0" presId="urn:microsoft.com/office/officeart/2005/8/layout/radial6"/>
@@ -11942,6 +12020,110 @@
             <a:spLocks noGrp="1"/>
           </p:cNvSpPr>
           <p:nvPr>
+            <p:ph type="title"/>
+          </p:nvPr>
+        </p:nvSpPr>
+        <p:spPr/>
+        <p:txBody>
+          <a:bodyPr/>
+          <a:lstStyle/>
+          <a:p>
+            <a:r>
+              <a:rPr lang="hr-HR" dirty="0" smtClean="0"/>
+              <a:t>Zaključak</a:t>
+            </a:r>
+            <a:endParaRPr lang="hr-HR" dirty="0"/>
+          </a:p>
+        </p:txBody>
+      </p:sp>
+      <p:sp>
+        <p:nvSpPr>
+          <p:cNvPr id="3" name="Content Placeholder 2"/>
+          <p:cNvSpPr>
+            <a:spLocks noGrp="1"/>
+          </p:cNvSpPr>
+          <p:nvPr>
+            <p:ph idx="1"/>
+          </p:nvPr>
+        </p:nvSpPr>
+        <p:spPr/>
+        <p:txBody>
+          <a:bodyPr/>
+          <a:lstStyle/>
+          <a:p>
+            <a:r>
+              <a:rPr lang="hr-HR" dirty="0" smtClean="0"/>
+              <a:t>Istraživanje podataka </a:t>
+            </a:r>
+          </a:p>
+          <a:p>
+            <a:r>
+              <a:rPr lang="hr-HR" dirty="0" smtClean="0"/>
+              <a:t>Predobrada podataka</a:t>
+            </a:r>
+          </a:p>
+          <a:p>
+            <a:r>
+              <a:rPr lang="hr-HR" dirty="0" smtClean="0"/>
+              <a:t>Dobri podaci više znače nego dobra arhitektura</a:t>
+            </a:r>
+          </a:p>
+          <a:p>
+            <a:r>
+              <a:rPr lang="hr-HR" dirty="0" smtClean="0"/>
+              <a:t>Izvršavanje mala probna treniranja</a:t>
+            </a:r>
+          </a:p>
+          <a:p>
+            <a:r>
+              <a:rPr lang="hr-HR" dirty="0" smtClean="0"/>
+              <a:t>Autonomna vozila su </a:t>
+            </a:r>
+            <a:r>
+              <a:rPr lang="hr-HR" smtClean="0"/>
+              <a:t>dio budućnosti</a:t>
+            </a:r>
+            <a:endParaRPr lang="hr-HR" dirty="0"/>
+          </a:p>
+        </p:txBody>
+      </p:sp>
+    </p:spTree>
+    <p:extLst>
+      <p:ext uri="{BB962C8B-B14F-4D97-AF65-F5344CB8AC3E}">
+        <p14:creationId xmlns:p14="http://schemas.microsoft.com/office/powerpoint/2010/main" val="981907926"/>
+      </p:ext>
+    </p:extLst>
+  </p:cSld>
+  <p:clrMapOvr>
+    <a:masterClrMapping/>
+  </p:clrMapOvr>
+</p:sld>
+</file>
+
+<file path=ppt/slides/slide14.xml><?xml version="1.0" encoding="utf-8"?>
+<p:sld xmlns:a="http://schemas.openxmlformats.org/drawingml/2006/main" xmlns:r="http://schemas.openxmlformats.org/officeDocument/2006/relationships" xmlns:p="http://schemas.openxmlformats.org/presentationml/2006/main">
+  <p:cSld>
+    <p:spTree>
+      <p:nvGrpSpPr>
+        <p:cNvPr id="1" name=""/>
+        <p:cNvGrpSpPr/>
+        <p:nvPr/>
+      </p:nvGrpSpPr>
+      <p:grpSpPr>
+        <a:xfrm>
+          <a:off x="0" y="0"/>
+          <a:ext cx="0" cy="0"/>
+          <a:chOff x="0" y="0"/>
+          <a:chExt cx="0" cy="0"/>
+        </a:xfrm>
+      </p:grpSpPr>
+      <p:sp>
+        <p:nvSpPr>
+          <p:cNvPr id="2" name="Title 1"/>
+          <p:cNvSpPr>
+            <a:spLocks noGrp="1"/>
+          </p:cNvSpPr>
+          <p:nvPr>
             <p:ph type="ctrTitle"/>
           </p:nvPr>
         </p:nvSpPr>
@@ -12781,8 +12963,8 @@
           </a:p>
         </p:txBody>
       </p:sp>
-      <mc:AlternateContent xmlns:mc="http://schemas.openxmlformats.org/markup-compatibility/2006">
-        <mc:Choice xmlns:a14="http://schemas.microsoft.com/office/drawing/2010/main" Requires="a14">
+      <mc:AlternateContent xmlns:mc="http://schemas.openxmlformats.org/markup-compatibility/2006" xmlns:a14="http://schemas.microsoft.com/office/drawing/2010/main">
+        <mc:Choice Requires="a14">
           <p:sp>
             <p:nvSpPr>
               <p:cNvPr id="4" name="Content Placeholder 3"/>
@@ -12819,24 +13001,32 @@
                         <m:accPr>
                           <m:chr m:val="̅"/>
                           <m:ctrlPr>
-                            <a:rPr lang="en-US" i="1"/>
+                            <a:rPr lang="en-US" i="1">
+                              <a:latin typeface="Cambria Math" panose="02040503050406030204" pitchFamily="18" charset="0"/>
+                            </a:rPr>
                           </m:ctrlPr>
                         </m:accPr>
                         <m:e>
                           <m:r>
-                            <a:rPr lang="hr-HR" i="1"/>
+                            <a:rPr lang="hr-HR" i="1">
+                              <a:latin typeface="Cambria Math" panose="02040503050406030204" pitchFamily="18" charset="0"/>
+                            </a:rPr>
                             <m:t>𝑥</m:t>
                           </m:r>
                         </m:e>
                       </m:acc>
                       <m:r>
-                        <a:rPr lang="en-US" i="1"/>
+                        <a:rPr lang="en-US" i="1">
+                          <a:latin typeface="Cambria Math" panose="02040503050406030204" pitchFamily="18" charset="0"/>
+                        </a:rPr>
                         <m:t>=</m:t>
                       </m:r>
                       <m:f>
                         <m:fPr>
                           <m:ctrlPr>
-                            <a:rPr lang="en-US" i="1"/>
+                            <a:rPr lang="en-US" i="1">
+                              <a:latin typeface="Cambria Math" panose="02040503050406030204" pitchFamily="18" charset="0"/>
+                            </a:rPr>
                           </m:ctrlPr>
                         </m:fPr>
                         <m:num>
@@ -12845,22 +13035,30 @@
                               <m:chr m:val="∑"/>
                               <m:limLoc m:val="undOvr"/>
                               <m:ctrlPr>
-                                <a:rPr lang="en-US" i="1"/>
+                                <a:rPr lang="en-US" i="1">
+                                  <a:latin typeface="Cambria Math" panose="02040503050406030204" pitchFamily="18" charset="0"/>
+                                </a:rPr>
                               </m:ctrlPr>
                             </m:naryPr>
                             <m:sub>
                               <m:r>
-                                <a:rPr lang="en-US" i="1"/>
+                                <a:rPr lang="en-US" i="1">
+                                  <a:latin typeface="Cambria Math" panose="02040503050406030204" pitchFamily="18" charset="0"/>
+                                </a:rPr>
                                 <m:t>𝑖</m:t>
                               </m:r>
                               <m:r>
-                                <a:rPr lang="en-US" i="1"/>
+                                <a:rPr lang="en-US" i="1">
+                                  <a:latin typeface="Cambria Math" panose="02040503050406030204" pitchFamily="18" charset="0"/>
+                                </a:rPr>
                                 <m:t>=1</m:t>
                               </m:r>
                             </m:sub>
                             <m:sup>
                               <m:r>
-                                <a:rPr lang="en-US" i="1"/>
+                                <a:rPr lang="en-US" i="1">
+                                  <a:latin typeface="Cambria Math" panose="02040503050406030204" pitchFamily="18" charset="0"/>
+                                </a:rPr>
                                 <m:t>𝑛</m:t>
                               </m:r>
                             </m:sup>
@@ -12868,18 +13066,24 @@
                               <m:sSub>
                                 <m:sSubPr>
                                   <m:ctrlPr>
-                                    <a:rPr lang="en-US" i="1"/>
+                                    <a:rPr lang="en-US" i="1">
+                                      <a:latin typeface="Cambria Math" panose="02040503050406030204" pitchFamily="18" charset="0"/>
+                                    </a:rPr>
                                   </m:ctrlPr>
                                 </m:sSubPr>
                                 <m:e>
                                   <m:r>
-                                    <a:rPr lang="en-US" i="1"/>
+                                    <a:rPr lang="en-US" i="1">
+                                      <a:latin typeface="Cambria Math" panose="02040503050406030204" pitchFamily="18" charset="0"/>
+                                    </a:rPr>
                                     <m:t>𝑤</m:t>
                                   </m:r>
                                 </m:e>
                                 <m:sub>
                                   <m:r>
-                                    <a:rPr lang="en-US" i="1"/>
+                                    <a:rPr lang="en-US" i="1">
+                                      <a:latin typeface="Cambria Math" panose="02040503050406030204" pitchFamily="18" charset="0"/>
+                                    </a:rPr>
                                     <m:t>𝑖</m:t>
                                   </m:r>
                                 </m:sub>
@@ -12887,18 +13091,24 @@
                               <m:sSub>
                                 <m:sSubPr>
                                   <m:ctrlPr>
-                                    <a:rPr lang="en-US" i="1"/>
+                                    <a:rPr lang="en-US" i="1">
+                                      <a:latin typeface="Cambria Math" panose="02040503050406030204" pitchFamily="18" charset="0"/>
+                                    </a:rPr>
                                   </m:ctrlPr>
                                 </m:sSubPr>
                                 <m:e>
                                   <m:r>
-                                    <a:rPr lang="en-US" i="1"/>
+                                    <a:rPr lang="en-US" i="1">
+                                      <a:latin typeface="Cambria Math" panose="02040503050406030204" pitchFamily="18" charset="0"/>
+                                    </a:rPr>
                                     <m:t>𝑥</m:t>
                                   </m:r>
                                 </m:e>
                                 <m:sub>
                                   <m:r>
-                                    <a:rPr lang="en-US" i="1"/>
+                                    <a:rPr lang="en-US" i="1">
+                                      <a:latin typeface="Cambria Math" panose="02040503050406030204" pitchFamily="18" charset="0"/>
+                                    </a:rPr>
                                     <m:t>𝑖</m:t>
                                   </m:r>
                                 </m:sub>
@@ -12912,22 +13122,30 @@
                               <m:chr m:val="∑"/>
                               <m:limLoc m:val="undOvr"/>
                               <m:ctrlPr>
-                                <a:rPr lang="en-US" i="1"/>
+                                <a:rPr lang="en-US" i="1">
+                                  <a:latin typeface="Cambria Math" panose="02040503050406030204" pitchFamily="18" charset="0"/>
+                                </a:rPr>
                               </m:ctrlPr>
                             </m:naryPr>
                             <m:sub>
                               <m:r>
-                                <a:rPr lang="en-US" i="1"/>
+                                <a:rPr lang="en-US" i="1">
+                                  <a:latin typeface="Cambria Math" panose="02040503050406030204" pitchFamily="18" charset="0"/>
+                                </a:rPr>
                                 <m:t>𝑖</m:t>
                               </m:r>
                               <m:r>
-                                <a:rPr lang="en-US" i="1"/>
+                                <a:rPr lang="en-US" i="1">
+                                  <a:latin typeface="Cambria Math" panose="02040503050406030204" pitchFamily="18" charset="0"/>
+                                </a:rPr>
                                 <m:t>=1</m:t>
                               </m:r>
                             </m:sub>
                             <m:sup>
                               <m:r>
-                                <a:rPr lang="en-US" i="1"/>
+                                <a:rPr lang="en-US" i="1">
+                                  <a:latin typeface="Cambria Math" panose="02040503050406030204" pitchFamily="18" charset="0"/>
+                                </a:rPr>
                                 <m:t>𝑛</m:t>
                               </m:r>
                             </m:sup>
@@ -12935,18 +13153,24 @@
                               <m:sSub>
                                 <m:sSubPr>
                                   <m:ctrlPr>
-                                    <a:rPr lang="en-US" i="1"/>
+                                    <a:rPr lang="en-US" i="1">
+                                      <a:latin typeface="Cambria Math" panose="02040503050406030204" pitchFamily="18" charset="0"/>
+                                    </a:rPr>
                                   </m:ctrlPr>
                                 </m:sSubPr>
                                 <m:e>
                                   <m:r>
-                                    <a:rPr lang="en-US" i="1"/>
+                                    <a:rPr lang="en-US" i="1">
+                                      <a:latin typeface="Cambria Math" panose="02040503050406030204" pitchFamily="18" charset="0"/>
+                                    </a:rPr>
                                     <m:t>𝑤</m:t>
                                   </m:r>
                                 </m:e>
                                 <m:sub>
                                   <m:r>
-                                    <a:rPr lang="en-US" i="1"/>
+                                    <a:rPr lang="en-US" i="1">
+                                      <a:latin typeface="Cambria Math" panose="02040503050406030204" pitchFamily="18" charset="0"/>
+                                    </a:rPr>
                                     <m:t>𝑖</m:t>
                                   </m:r>
                                 </m:sub>
@@ -12987,18 +13211,24 @@
                         <m:accPr>
                           <m:chr m:val="̅"/>
                           <m:ctrlPr>
-                            <a:rPr lang="en-US" i="1"/>
+                            <a:rPr lang="en-US" i="1">
+                              <a:latin typeface="Cambria Math" panose="02040503050406030204" pitchFamily="18" charset="0"/>
+                            </a:rPr>
                           </m:ctrlPr>
                         </m:accPr>
                         <m:e>
                           <m:r>
-                            <a:rPr lang="hr-HR" i="1"/>
+                            <a:rPr lang="hr-HR" i="1">
+                              <a:latin typeface="Cambria Math" panose="02040503050406030204" pitchFamily="18" charset="0"/>
+                            </a:rPr>
                             <m:t>𝑥</m:t>
                           </m:r>
                         </m:e>
                       </m:acc>
                       <m:r>
-                        <a:rPr lang="hr-HR" i="1"/>
+                        <a:rPr lang="hr-HR" i="1">
+                          <a:latin typeface="Cambria Math" panose="02040503050406030204" pitchFamily="18" charset="0"/>
+                        </a:rPr>
                         <m:t>=</m:t>
                       </m:r>
                       <m:nary>
@@ -13007,22 +13237,30 @@
                           <m:limLoc m:val="undOvr"/>
                           <m:grow m:val="on"/>
                           <m:ctrlPr>
-                            <a:rPr lang="en-US" i="1"/>
+                            <a:rPr lang="en-US" i="1">
+                              <a:latin typeface="Cambria Math" panose="02040503050406030204" pitchFamily="18" charset="0"/>
+                            </a:rPr>
                           </m:ctrlPr>
                         </m:naryPr>
                         <m:sub>
                           <m:r>
-                            <a:rPr lang="hr-HR" i="1"/>
+                            <a:rPr lang="hr-HR" i="1">
+                              <a:latin typeface="Cambria Math" panose="02040503050406030204" pitchFamily="18" charset="0"/>
+                            </a:rPr>
                             <m:t>𝑖</m:t>
                           </m:r>
                           <m:r>
-                            <a:rPr lang="hr-HR" i="1"/>
+                            <a:rPr lang="hr-HR" i="1">
+                              <a:latin typeface="Cambria Math" panose="02040503050406030204" pitchFamily="18" charset="0"/>
+                            </a:rPr>
                             <m:t>=1</m:t>
                           </m:r>
                         </m:sub>
                         <m:sup>
                           <m:r>
-                            <a:rPr lang="hr-HR" i="1"/>
+                            <a:rPr lang="hr-HR" i="1">
+                              <a:latin typeface="Cambria Math" panose="02040503050406030204" pitchFamily="18" charset="0"/>
+                            </a:rPr>
                             <m:t>𝑛</m:t>
                           </m:r>
                         </m:sup>
@@ -13030,24 +13268,32 @@
                           <m:sSubSup>
                             <m:sSubSupPr>
                               <m:ctrlPr>
-                                <a:rPr lang="en-US" i="1"/>
+                                <a:rPr lang="en-US" i="1">
+                                  <a:latin typeface="Cambria Math" panose="02040503050406030204" pitchFamily="18" charset="0"/>
+                                </a:rPr>
                               </m:ctrlPr>
                             </m:sSubSupPr>
                             <m:e>
                               <m:r>
-                                <a:rPr lang="hr-HR" i="1"/>
+                                <a:rPr lang="hr-HR" i="1">
+                                  <a:latin typeface="Cambria Math" panose="02040503050406030204" pitchFamily="18" charset="0"/>
+                                </a:rPr>
                                 <m:t>𝑤</m:t>
                               </m:r>
                             </m:e>
                             <m:sub>
                               <m:r>
-                                <a:rPr lang="hr-HR" i="1"/>
+                                <a:rPr lang="hr-HR" i="1">
+                                  <a:latin typeface="Cambria Math" panose="02040503050406030204" pitchFamily="18" charset="0"/>
+                                </a:rPr>
                                 <m:t>𝑖</m:t>
                               </m:r>
                             </m:sub>
                             <m:sup>
                               <m:r>
-                                <a:rPr lang="hr-HR" i="1"/>
+                                <a:rPr lang="hr-HR" i="1">
+                                  <a:latin typeface="Cambria Math" panose="02040503050406030204" pitchFamily="18" charset="0"/>
+                                </a:rPr>
                                 <m:t>′</m:t>
                               </m:r>
                             </m:sup>
@@ -13055,18 +13301,24 @@
                           <m:sSub>
                             <m:sSubPr>
                               <m:ctrlPr>
-                                <a:rPr lang="en-US" i="1"/>
+                                <a:rPr lang="en-US" i="1">
+                                  <a:latin typeface="Cambria Math" panose="02040503050406030204" pitchFamily="18" charset="0"/>
+                                </a:rPr>
                               </m:ctrlPr>
                             </m:sSubPr>
                             <m:e>
                               <m:r>
-                                <a:rPr lang="hr-HR" i="1"/>
+                                <a:rPr lang="hr-HR" i="1">
+                                  <a:latin typeface="Cambria Math" panose="02040503050406030204" pitchFamily="18" charset="0"/>
+                                </a:rPr>
                                 <m:t>𝑥</m:t>
                               </m:r>
                             </m:e>
                             <m:sub>
                               <m:r>
-                                <a:rPr lang="hr-HR" i="1"/>
+                                <a:rPr lang="hr-HR" i="1">
+                                  <a:latin typeface="Cambria Math" panose="02040503050406030204" pitchFamily="18" charset="0"/>
+                                </a:rPr>
                                 <m:t>𝑖</m:t>
                               </m:r>
                             </m:sub>
@@ -13103,7 +13355,7 @@
             </p:txBody>
           </p:sp>
         </mc:Choice>
-        <mc:Fallback>
+        <mc:Fallback xmlns="">
           <p:sp>
             <p:nvSpPr>
               <p:cNvPr id="4" name="Content Placeholder 3"/>

</xml_diff>

<commit_message>
Dorada po instrukciji mentora
</commit_message>
<xml_diff>
--- a/Diplmoski_Marko_Rasetina.pptx
+++ b/Diplmoski_Marko_Rasetina.pptx
@@ -11780,12 +11780,12 @@
       </p:sp>
       <p:pic>
         <p:nvPicPr>
-          <p:cNvPr id="4" name="Content Placeholder 3"/>
+          <p:cNvPr id="5" name="Content Placeholder 4"/>
           <p:cNvPicPr>
             <a:picLocks noGrp="1" noChangeAspect="1"/>
           </p:cNvPicPr>
           <p:nvPr>
-            <p:ph idx="1"/>
+            <p:ph sz="half" idx="1"/>
           </p:nvPr>
         </p:nvPicPr>
         <p:blipFill>
@@ -11802,8 +11802,54 @@
         </p:blipFill>
         <p:spPr>
           <a:xfrm>
-            <a:off x="284609" y="2492680"/>
-            <a:ext cx="11512833" cy="2566970"/>
+            <a:off x="426572" y="2339250"/>
+            <a:ext cx="4969591" cy="3333639"/>
+          </a:xfrm>
+          <a:prstGeom prst="rect">
+            <a:avLst/>
+          </a:prstGeom>
+          <a:ln w="38100" cap="sq">
+            <a:solidFill>
+              <a:srgbClr val="000000"/>
+            </a:solidFill>
+            <a:prstDash val="solid"/>
+            <a:miter lim="800000"/>
+          </a:ln>
+          <a:effectLst>
+            <a:outerShdw blurRad="50800" dist="38100" dir="2700000" algn="tl" rotWithShape="0">
+              <a:srgbClr val="000000">
+                <a:alpha val="43000"/>
+              </a:srgbClr>
+            </a:outerShdw>
+          </a:effectLst>
+        </p:spPr>
+      </p:pic>
+      <p:pic>
+        <p:nvPicPr>
+          <p:cNvPr id="7" name="Content Placeholder 6"/>
+          <p:cNvPicPr>
+            <a:picLocks noGrp="1" noChangeAspect="1"/>
+          </p:cNvPicPr>
+          <p:nvPr>
+            <p:ph sz="half" idx="2"/>
+          </p:nvPr>
+        </p:nvPicPr>
+        <p:blipFill>
+          <a:blip r:embed="rId3">
+            <a:extLst>
+              <a:ext uri="{28A0092B-C50C-407E-A947-70E740481C1C}">
+                <a14:useLocalDpi xmlns:a14="http://schemas.microsoft.com/office/drawing/2010/main" val="0"/>
+              </a:ext>
+            </a:extLst>
+          </a:blip>
+          <a:stretch>
+            <a:fillRect/>
+          </a:stretch>
+        </p:blipFill>
+        <p:spPr>
+          <a:xfrm>
+            <a:off x="6076718" y="190748"/>
+            <a:ext cx="3698940" cy="6495702"/>
           </a:xfrm>
           <a:prstGeom prst="rect">
             <a:avLst/>
@@ -12071,17 +12117,22 @@
           <a:p>
             <a:r>
               <a:rPr lang="hr-HR" dirty="0" smtClean="0"/>
-              <a:t>Izvršavanje mala probna treniranja</a:t>
+              <a:t>Izvršavanje </a:t>
             </a:r>
-          </a:p>
-          <a:p>
             <a:r>
               <a:rPr lang="hr-HR" dirty="0" smtClean="0"/>
-              <a:t>Autonomna vozila su </a:t>
+              <a:t>manjih </a:t>
             </a:r>
             <a:r>
               <a:rPr lang="hr-HR" smtClean="0"/>
-              <a:t>dio budućnosti</a:t>
+              <a:t>probnih treniranja</a:t>
+            </a:r>
+            <a:endParaRPr lang="hr-HR" dirty="0" smtClean="0"/>
+          </a:p>
+          <a:p>
+            <a:r>
+              <a:rPr lang="hr-HR" dirty="0" smtClean="0"/>
+              <a:t>Autonomna vozila su dio budućnosti</a:t>
             </a:r>
             <a:endParaRPr lang="hr-HR" dirty="0"/>
           </a:p>
@@ -12793,25 +12844,7 @@
           <a:bodyPr/>
           <a:lstStyle/>
           <a:p>
-            <a:r>
-              <a:rPr lang="hr-HR" dirty="0" smtClean="0"/>
-              <a:t>Uzrok pristrane vrijednosti kuta zakreta</a:t>
-            </a:r>
-          </a:p>
-          <a:p>
-            <a:r>
-              <a:rPr lang="hr-HR" dirty="0" smtClean="0"/>
-              <a:t>Iskoristiti analogni upravljač</a:t>
-            </a:r>
-          </a:p>
-          <a:p>
-            <a:endParaRPr lang="hr-HR" dirty="0"/>
-          </a:p>
-          <a:p>
             <a:endParaRPr lang="hr-HR" dirty="0" smtClean="0"/>
-          </a:p>
-          <a:p>
-            <a:endParaRPr lang="hr-HR" dirty="0"/>
           </a:p>
           <a:p>
             <a:pPr marL="0" indent="0">
@@ -12820,22 +12853,35 @@
             <a:endParaRPr lang="hr-HR" dirty="0" smtClean="0"/>
           </a:p>
           <a:p>
+            <a:endParaRPr lang="hr-HR" dirty="0"/>
+          </a:p>
+          <a:p>
+            <a:endParaRPr lang="hr-HR" dirty="0" smtClean="0"/>
+          </a:p>
+          <a:p>
+            <a:endParaRPr lang="hr-HR" dirty="0"/>
+          </a:p>
+          <a:p>
             <a:pPr marL="0" indent="0">
               <a:buNone/>
             </a:pPr>
             <a:endParaRPr lang="hr-HR" dirty="0" smtClean="0"/>
           </a:p>
+          <a:p>
+            <a:pPr marL="0" indent="0">
+              <a:buNone/>
+            </a:pPr>
+            <a:endParaRPr lang="hr-HR" dirty="0" smtClean="0"/>
+          </a:p>
         </p:txBody>
       </p:sp>
       <p:pic>
         <p:nvPicPr>
-          <p:cNvPr id="6" name="Content Placeholder 5"/>
+          <p:cNvPr id="7" name="Picture 6"/>
           <p:cNvPicPr>
-            <a:picLocks noGrp="1" noChangeAspect="1"/>
+            <a:picLocks noChangeAspect="1"/>
           </p:cNvPicPr>
-          <p:nvPr>
-            <p:ph sz="half" idx="2"/>
-          </p:nvPr>
+          <p:nvPr/>
         </p:nvPicPr>
         <p:blipFill>
           <a:blip r:embed="rId2">
@@ -12851,31 +12897,42 @@
         </p:blipFill>
         <p:spPr>
           <a:xfrm>
-            <a:off x="5124445" y="2154241"/>
-            <a:ext cx="4373010" cy="3887120"/>
+            <a:off x="355743" y="2154241"/>
+            <a:ext cx="4637164" cy="253716"/>
           </a:xfrm>
           <a:prstGeom prst="rect">
             <a:avLst/>
           </a:prstGeom>
-          <a:ln w="38100" cap="sq">
-            <a:solidFill>
-              <a:srgbClr val="000000"/>
-            </a:solidFill>
-            <a:prstDash val="solid"/>
-            <a:miter lim="800000"/>
-          </a:ln>
-          <a:effectLst>
-            <a:outerShdw blurRad="50800" dist="38100" dir="2700000" algn="tl" rotWithShape="0">
-              <a:srgbClr val="000000">
-                <a:alpha val="43000"/>
-              </a:srgbClr>
-            </a:outerShdw>
-          </a:effectLst>
         </p:spPr>
       </p:pic>
+      <p:sp>
+        <p:nvSpPr>
+          <p:cNvPr id="3" name="Content Placeholder 2"/>
+          <p:cNvSpPr>
+            <a:spLocks noGrp="1"/>
+          </p:cNvSpPr>
+          <p:nvPr>
+            <p:ph sz="half" idx="2"/>
+          </p:nvPr>
+        </p:nvSpPr>
+        <p:spPr/>
+        <p:txBody>
+          <a:bodyPr/>
+          <a:lstStyle/>
+          <a:p>
+            <a:r>
+              <a:rPr lang="hr-HR" dirty="0"/>
+              <a:t>Iskoristiti analogni upravljač</a:t>
+            </a:r>
+          </a:p>
+          <a:p>
+            <a:endParaRPr lang="hr-HR" dirty="0"/>
+          </a:p>
+        </p:txBody>
+      </p:sp>
       <p:pic>
         <p:nvPicPr>
-          <p:cNvPr id="7" name="Picture 6"/>
+          <p:cNvPr id="5" name="Picture 4"/>
           <p:cNvPicPr>
             <a:picLocks noChangeAspect="1"/>
           </p:cNvPicPr>
@@ -12895,12 +12952,26 @@
         </p:blipFill>
         <p:spPr>
           <a:xfrm>
-            <a:off x="641873" y="3981399"/>
-            <a:ext cx="4254956" cy="232804"/>
+            <a:off x="616921" y="2713117"/>
+            <a:ext cx="4114808" cy="3657607"/>
           </a:xfrm>
           <a:prstGeom prst="rect">
             <a:avLst/>
           </a:prstGeom>
+          <a:ln w="38100" cap="sq">
+            <a:solidFill>
+              <a:srgbClr val="000000"/>
+            </a:solidFill>
+            <a:prstDash val="solid"/>
+            <a:miter lim="800000"/>
+          </a:ln>
+          <a:effectLst>
+            <a:outerShdw blurRad="50800" dist="38100" dir="2700000" algn="tl" rotWithShape="0">
+              <a:srgbClr val="000000">
+                <a:alpha val="43000"/>
+              </a:srgbClr>
+            </a:outerShdw>
+          </a:effectLst>
         </p:spPr>
       </p:pic>
     </p:spTree>

</xml_diff>

<commit_message>
Dodani linkovi upotrijebljenih slika, male korekcije u prezentaciji
</commit_message>
<xml_diff>
--- a/Diplmoski_Marko_Rasetina.pptx
+++ b/Diplmoski_Marko_Rasetina.pptx
@@ -6597,7 +6597,7 @@
             <a:fld id="{B61BEF0D-F0BB-DE4B-95CE-6DB70DBA9567}" type="datetimeFigureOut">
               <a:rPr lang="en-US" dirty="0"/>
               <a:pPr/>
-              <a:t>8/27/2019</a:t>
+              <a:t>8/28/2019</a:t>
             </a:fld>
             <a:endParaRPr lang="en-US" dirty="0"/>
           </a:p>
@@ -6845,7 +6845,7 @@
             <a:fld id="{B61BEF0D-F0BB-DE4B-95CE-6DB70DBA9567}" type="datetimeFigureOut">
               <a:rPr lang="en-US" dirty="0"/>
               <a:pPr/>
-              <a:t>8/27/2019</a:t>
+              <a:t>8/28/2019</a:t>
             </a:fld>
             <a:endParaRPr lang="en-US" dirty="0"/>
           </a:p>
@@ -7156,7 +7156,7 @@
             <a:fld id="{B61BEF0D-F0BB-DE4B-95CE-6DB70DBA9567}" type="datetimeFigureOut">
               <a:rPr lang="en-US" dirty="0"/>
               <a:pPr/>
-              <a:t>8/27/2019</a:t>
+              <a:t>8/28/2019</a:t>
             </a:fld>
             <a:endParaRPr lang="en-US" dirty="0"/>
           </a:p>
@@ -7480,7 +7480,7 @@
             <a:fld id="{B61BEF0D-F0BB-DE4B-95CE-6DB70DBA9567}" type="datetimeFigureOut">
               <a:rPr lang="en-US" dirty="0"/>
               <a:pPr/>
-              <a:t>8/27/2019</a:t>
+              <a:t>8/28/2019</a:t>
             </a:fld>
             <a:endParaRPr lang="en-US" dirty="0"/>
           </a:p>
@@ -7791,7 +7791,7 @@
             <a:fld id="{B61BEF0D-F0BB-DE4B-95CE-6DB70DBA9567}" type="datetimeFigureOut">
               <a:rPr lang="en-US" dirty="0"/>
               <a:pPr/>
-              <a:t>8/27/2019</a:t>
+              <a:t>8/28/2019</a:t>
             </a:fld>
             <a:endParaRPr lang="en-US" dirty="0"/>
           </a:p>
@@ -8175,7 +8175,7 @@
             <a:fld id="{B61BEF0D-F0BB-DE4B-95CE-6DB70DBA9567}" type="datetimeFigureOut">
               <a:rPr lang="en-US" dirty="0"/>
               <a:pPr/>
-              <a:t>8/27/2019</a:t>
+              <a:t>8/28/2019</a:t>
             </a:fld>
             <a:endParaRPr lang="en-US" dirty="0"/>
           </a:p>
@@ -8341,7 +8341,7 @@
           <a:p>
             <a:fld id="{55C6B4A9-1611-4792-9094-5F34BCA07E0B}" type="datetimeFigureOut">
               <a:rPr lang="en-US" dirty="0"/>
-              <a:t>8/27/2019</a:t>
+              <a:t>8/28/2019</a:t>
             </a:fld>
             <a:endParaRPr lang="en-US" dirty="0"/>
           </a:p>
@@ -8517,7 +8517,7 @@
             <a:fld id="{B61BEF0D-F0BB-DE4B-95CE-6DB70DBA9567}" type="datetimeFigureOut">
               <a:rPr lang="en-US" dirty="0"/>
               <a:pPr/>
-              <a:t>8/27/2019</a:t>
+              <a:t>8/28/2019</a:t>
             </a:fld>
             <a:endParaRPr lang="en-US" dirty="0"/>
           </a:p>
@@ -8690,7 +8690,7 @@
             <a:fld id="{B61BEF0D-F0BB-DE4B-95CE-6DB70DBA9567}" type="datetimeFigureOut">
               <a:rPr lang="en-US" dirty="0"/>
               <a:pPr/>
-              <a:t>8/27/2019</a:t>
+              <a:t>8/28/2019</a:t>
             </a:fld>
             <a:endParaRPr lang="en-US" dirty="0"/>
           </a:p>
@@ -8934,7 +8934,7 @@
             <a:fld id="{B61BEF0D-F0BB-DE4B-95CE-6DB70DBA9567}" type="datetimeFigureOut">
               <a:rPr lang="en-US" dirty="0"/>
               <a:pPr/>
-              <a:t>8/27/2019</a:t>
+              <a:t>8/28/2019</a:t>
             </a:fld>
             <a:endParaRPr lang="en-US" dirty="0"/>
           </a:p>
@@ -9162,7 +9162,7 @@
           <a:p>
             <a:fld id="{EB712588-04B1-427B-82EE-E8DB90309F08}" type="datetimeFigureOut">
               <a:rPr lang="en-US" dirty="0"/>
-              <a:t>8/27/2019</a:t>
+              <a:t>8/28/2019</a:t>
             </a:fld>
             <a:endParaRPr lang="en-US" dirty="0"/>
           </a:p>
@@ -9532,7 +9532,7 @@
             <a:fld id="{B61BEF0D-F0BB-DE4B-95CE-6DB70DBA9567}" type="datetimeFigureOut">
               <a:rPr lang="en-US" dirty="0"/>
               <a:pPr/>
-              <a:t>8/27/2019</a:t>
+              <a:t>8/28/2019</a:t>
             </a:fld>
             <a:endParaRPr lang="en-US" dirty="0"/>
           </a:p>
@@ -9652,7 +9652,7 @@
             <a:fld id="{B61BEF0D-F0BB-DE4B-95CE-6DB70DBA9567}" type="datetimeFigureOut">
               <a:rPr lang="en-US" dirty="0"/>
               <a:pPr/>
-              <a:t>8/27/2019</a:t>
+              <a:t>8/28/2019</a:t>
             </a:fld>
             <a:endParaRPr lang="en-US" dirty="0"/>
           </a:p>
@@ -9744,7 +9744,7 @@
             <a:fld id="{B61BEF0D-F0BB-DE4B-95CE-6DB70DBA9567}" type="datetimeFigureOut">
               <a:rPr lang="en-US" dirty="0"/>
               <a:pPr/>
-              <a:t>8/27/2019</a:t>
+              <a:t>8/28/2019</a:t>
             </a:fld>
             <a:endParaRPr lang="en-US" dirty="0"/>
           </a:p>
@@ -9995,7 +9995,7 @@
           <a:p>
             <a:fld id="{42A54C80-263E-416B-A8E0-580EDEADCBDC}" type="datetimeFigureOut">
               <a:rPr lang="en-US" dirty="0"/>
-              <a:t>8/27/2019</a:t>
+              <a:t>8/28/2019</a:t>
             </a:fld>
             <a:endParaRPr lang="en-US" dirty="0"/>
           </a:p>
@@ -10254,7 +10254,7 @@
             <a:fld id="{B61BEF0D-F0BB-DE4B-95CE-6DB70DBA9567}" type="datetimeFigureOut">
               <a:rPr lang="en-US" dirty="0"/>
               <a:pPr/>
-              <a:t>8/27/2019</a:t>
+              <a:t>8/28/2019</a:t>
             </a:fld>
             <a:endParaRPr lang="en-US" dirty="0"/>
           </a:p>
@@ -10996,7 +10996,7 @@
             <a:fld id="{B61BEF0D-F0BB-DE4B-95CE-6DB70DBA9567}" type="datetimeFigureOut">
               <a:rPr lang="en-US" dirty="0"/>
               <a:pPr/>
-              <a:t>8/27/2019</a:t>
+              <a:t>8/28/2019</a:t>
             </a:fld>
             <a:endParaRPr lang="en-US" dirty="0"/>
           </a:p>
@@ -11579,6 +11579,14 @@
   <p:clrMapOvr>
     <a:masterClrMapping/>
   </p:clrMapOvr>
+  <mc:AlternateContent xmlns:mc="http://schemas.openxmlformats.org/markup-compatibility/2006">
+    <mc:Choice xmlns:p14="http://schemas.microsoft.com/office/powerpoint/2010/main" Requires="p14">
+      <p:transition p14:dur="0"/>
+    </mc:Choice>
+    <mc:Fallback>
+      <p:transition/>
+    </mc:Fallback>
+  </mc:AlternateContent>
   <p:timing>
     <p:tnLst>
       <p:par>
@@ -12117,15 +12125,11 @@
           <a:p>
             <a:r>
               <a:rPr lang="hr-HR" dirty="0" smtClean="0"/>
-              <a:t>Izvršavanje </a:t>
+              <a:t>Manji</a:t>
             </a:r>
             <a:r>
               <a:rPr lang="hr-HR" dirty="0" smtClean="0"/>
-              <a:t>manjih </a:t>
-            </a:r>
-            <a:r>
-              <a:rPr lang="hr-HR" smtClean="0"/>
-              <a:t>probnih treniranja</a:t>
+              <a:t> probni treninzi</a:t>
             </a:r>
             <a:endParaRPr lang="hr-HR" dirty="0" smtClean="0"/>
           </a:p>
@@ -12148,6 +12152,13 @@
   <p:clrMapOvr>
     <a:masterClrMapping/>
   </p:clrMapOvr>
+  <p:timing>
+    <p:tnLst>
+      <p:par>
+        <p:cTn id="1" dur="indefinite" restart="never" nodeType="tmRoot"/>
+      </p:par>
+    </p:tnLst>
+  </p:timing>
 </p:sld>
 </file>
 
@@ -12337,6 +12348,14 @@
   <p:clrMapOvr>
     <a:masterClrMapping/>
   </p:clrMapOvr>
+  <mc:AlternateContent xmlns:mc="http://schemas.openxmlformats.org/markup-compatibility/2006">
+    <mc:Choice xmlns:p14="http://schemas.microsoft.com/office/powerpoint/2010/main" Requires="p14">
+      <p:transition p14:dur="0"/>
+    </mc:Choice>
+    <mc:Fallback>
+      <p:transition/>
+    </mc:Fallback>
+  </mc:AlternateContent>
   <p:timing>
     <p:tnLst>
       <p:par>
@@ -12921,8 +12940,18 @@
           <a:lstStyle/>
           <a:p>
             <a:r>
+              <a:rPr lang="hr-HR" dirty="0" smtClean="0"/>
+              <a:t>Ukloniti dio podataka koji doprinosi pristranosti</a:t>
+            </a:r>
+          </a:p>
+          <a:p>
+            <a:r>
+              <a:rPr lang="hr-HR" dirty="0" smtClean="0"/>
+              <a:t>Iskoristiti </a:t>
+            </a:r>
+            <a:r>
               <a:rPr lang="hr-HR" dirty="0"/>
-              <a:t>Iskoristiti analogni upravljač</a:t>
+              <a:t>analogni upravljač</a:t>
             </a:r>
           </a:p>
           <a:p>

</xml_diff>